<commit_message>
11 July PM update
</commit_message>
<xml_diff>
--- a/ppt/dprk_missile_testing.pptx
+++ b/ppt/dprk_missile_testing.pptx
@@ -5,7 +5,7 @@
     <p:sldMasterId id="2147483648" r:id="rId4"/>
   </p:sldMasterIdLst>
   <p:notesMasterIdLst>
-    <p:notesMasterId r:id="rId14"/>
+    <p:notesMasterId r:id="rId17"/>
   </p:notesMasterIdLst>
   <p:sldIdLst>
     <p:sldId id="256" r:id="rId5"/>
@@ -15,8 +15,11 @@
     <p:sldId id="281" r:id="rId9"/>
     <p:sldId id="282" r:id="rId10"/>
     <p:sldId id="283" r:id="rId11"/>
-    <p:sldId id="284" r:id="rId12"/>
-    <p:sldId id="285" r:id="rId13"/>
+    <p:sldId id="285" r:id="rId12"/>
+    <p:sldId id="286" r:id="rId13"/>
+    <p:sldId id="284" r:id="rId14"/>
+    <p:sldId id="287" r:id="rId15"/>
+    <p:sldId id="288" r:id="rId16"/>
   </p:sldIdLst>
   <p:sldSz cx="12192000" cy="6858000"/>
   <p:notesSz cx="6858000" cy="9144000"/>
@@ -205,7 +208,7 @@
           <a:p>
             <a:fld id="{C452ADB1-275D-430A-89EE-5C7E6CFF6FF2}" type="datetimeFigureOut">
               <a:rPr lang="en-US" smtClean="0"/>
-              <a:t>7/10/2023</a:t>
+              <a:t>7/11/2023</a:t>
             </a:fld>
             <a:endParaRPr lang="en-US" dirty="0"/>
           </a:p>
@@ -689,6 +692,93 @@
           <a:p>
             <a:r>
               <a:rPr lang="en-US" dirty="0"/>
+              <a:t>Distort or misreport</a:t>
+            </a:r>
+          </a:p>
+        </p:txBody>
+      </p:sp>
+      <p:sp>
+        <p:nvSpPr>
+          <p:cNvPr id="4" name="Slide Number Placeholder 3"/>
+          <p:cNvSpPr>
+            <a:spLocks noGrp="1"/>
+          </p:cNvSpPr>
+          <p:nvPr>
+            <p:ph type="sldNum" sz="quarter" idx="5"/>
+          </p:nvPr>
+        </p:nvSpPr>
+        <p:spPr/>
+        <p:txBody>
+          <a:bodyPr/>
+          <a:lstStyle/>
+          <a:p>
+            <a:fld id="{4B725628-3A68-42F4-BA86-981817953149}" type="slidenum">
+              <a:rPr lang="en-US" smtClean="0"/>
+              <a:t>5</a:t>
+            </a:fld>
+            <a:endParaRPr lang="en-US" dirty="0"/>
+          </a:p>
+        </p:txBody>
+      </p:sp>
+    </p:spTree>
+    <p:extLst>
+      <p:ext uri="{BB962C8B-B14F-4D97-AF65-F5344CB8AC3E}">
+        <p14:creationId xmlns:p14="http://schemas.microsoft.com/office/powerpoint/2010/main" val="2023609695"/>
+      </p:ext>
+    </p:extLst>
+  </p:cSld>
+  <p:clrMapOvr>
+    <a:masterClrMapping/>
+  </p:clrMapOvr>
+</p:notes>
+</file>
+
+<file path=ppt/notesSlides/notesSlide4.xml><?xml version="1.0" encoding="utf-8"?>
+<p:notes xmlns:a="http://schemas.openxmlformats.org/drawingml/2006/main" xmlns:r="http://schemas.openxmlformats.org/officeDocument/2006/relationships" xmlns:p="http://schemas.openxmlformats.org/presentationml/2006/main">
+  <p:cSld>
+    <p:spTree>
+      <p:nvGrpSpPr>
+        <p:cNvPr id="1" name=""/>
+        <p:cNvGrpSpPr/>
+        <p:nvPr/>
+      </p:nvGrpSpPr>
+      <p:grpSpPr>
+        <a:xfrm>
+          <a:off x="0" y="0"/>
+          <a:ext cx="0" cy="0"/>
+          <a:chOff x="0" y="0"/>
+          <a:chExt cx="0" cy="0"/>
+        </a:xfrm>
+      </p:grpSpPr>
+      <p:sp>
+        <p:nvSpPr>
+          <p:cNvPr id="2" name="Slide Image Placeholder 1"/>
+          <p:cNvSpPr>
+            <a:spLocks noGrp="1" noRot="1" noChangeAspect="1"/>
+          </p:cNvSpPr>
+          <p:nvPr>
+            <p:ph type="sldImg"/>
+          </p:nvPr>
+        </p:nvSpPr>
+        <p:spPr/>
+      </p:sp>
+      <p:sp>
+        <p:nvSpPr>
+          <p:cNvPr id="3" name="Notes Placeholder 2"/>
+          <p:cNvSpPr>
+            <a:spLocks noGrp="1"/>
+          </p:cNvSpPr>
+          <p:nvPr>
+            <p:ph type="body" idx="1"/>
+          </p:nvPr>
+        </p:nvSpPr>
+        <p:spPr/>
+        <p:txBody>
+          <a:bodyPr/>
+          <a:lstStyle/>
+          <a:p>
+            <a:r>
+              <a:rPr lang="en-US" dirty="0"/>
               <a:t>Highlight</a:t>
             </a:r>
           </a:p>
@@ -745,7 +835,7 @@
 </p:notes>
 </file>
 
-<file path=ppt/notesSlides/notesSlide4.xml><?xml version="1.0" encoding="utf-8"?>
+<file path=ppt/notesSlides/notesSlide5.xml><?xml version="1.0" encoding="utf-8"?>
 <p:notes xmlns:a="http://schemas.openxmlformats.org/drawingml/2006/main" xmlns:r="http://schemas.openxmlformats.org/officeDocument/2006/relationships" xmlns:p="http://schemas.openxmlformats.org/presentationml/2006/main">
   <p:cSld>
     <p:spTree>
@@ -813,7 +903,7 @@
           <a:p>
             <a:fld id="{4B725628-3A68-42F4-BA86-981817953149}" type="slidenum">
               <a:rPr lang="en-US" smtClean="0"/>
-              <a:t>8</a:t>
+              <a:t>10</a:t>
             </a:fld>
             <a:endParaRPr lang="en-US" dirty="0"/>
           </a:p>
@@ -9625,7 +9715,7 @@
           <a:p>
             <a:fld id="{7005E26E-BCB2-4FD5-8FD5-81A5EAE94C21}" type="datetime1">
               <a:rPr lang="en-US" smtClean="0"/>
-              <a:t>7/10/2023</a:t>
+              <a:t>7/11/2023</a:t>
             </a:fld>
             <a:endParaRPr lang="en-US" dirty="0"/>
           </a:p>
@@ -9827,7 +9917,7 @@
           <a:p>
             <a:fld id="{9CC2E9B8-0487-42E4-B571-744A3D775783}" type="datetime1">
               <a:rPr lang="en-US" smtClean="0"/>
-              <a:t>7/10/2023</a:t>
+              <a:t>7/11/2023</a:t>
             </a:fld>
             <a:endParaRPr lang="en-US" dirty="0"/>
           </a:p>
@@ -10002,7 +10092,7 @@
           <a:p>
             <a:fld id="{9052E32D-1E84-43FD-8158-FFFE757EB0E8}" type="datetime1">
               <a:rPr lang="en-US" smtClean="0"/>
-              <a:t>7/10/2023</a:t>
+              <a:t>7/11/2023</a:t>
             </a:fld>
             <a:endParaRPr lang="en-US" dirty="0"/>
           </a:p>
@@ -10202,7 +10292,7 @@
           <a:p>
             <a:fld id="{8585C470-CD19-455C-B830-6D252EAD7FE5}" type="datetime1">
               <a:rPr lang="en-US" smtClean="0"/>
-              <a:t>7/10/2023</a:t>
+              <a:t>7/11/2023</a:t>
             </a:fld>
             <a:endParaRPr lang="en-US" dirty="0"/>
           </a:p>
@@ -19095,7 +19185,7 @@
           <a:p>
             <a:fld id="{7F85C43C-50D9-4F49-A136-0EFF292F93ED}" type="datetime1">
               <a:rPr lang="en-US" smtClean="0"/>
-              <a:t>7/10/2023</a:t>
+              <a:t>7/11/2023</a:t>
             </a:fld>
             <a:endParaRPr lang="en-US" dirty="0"/>
           </a:p>
@@ -19364,7 +19454,7 @@
           <a:p>
             <a:fld id="{7B53B1A3-0AEF-4064-A724-D27D660C8653}" type="datetime1">
               <a:rPr lang="en-US" smtClean="0"/>
-              <a:t>7/10/2023</a:t>
+              <a:t>7/11/2023</a:t>
             </a:fld>
             <a:endParaRPr lang="en-US" dirty="0"/>
           </a:p>
@@ -19757,7 +19847,7 @@
           <a:p>
             <a:fld id="{37D5D0F2-BF66-4A24-9384-A0129B196518}" type="datetime1">
               <a:rPr lang="en-US" smtClean="0"/>
-              <a:t>7/10/2023</a:t>
+              <a:t>7/11/2023</a:t>
             </a:fld>
             <a:endParaRPr lang="en-US" dirty="0"/>
           </a:p>
@@ -19870,7 +19960,7 @@
           <a:p>
             <a:fld id="{8C318A6C-4F6B-48D2-BDB0-D7413B3FDB0A}" type="datetime1">
               <a:rPr lang="en-US" smtClean="0"/>
-              <a:t>7/10/2023</a:t>
+              <a:t>7/11/2023</a:t>
             </a:fld>
             <a:endParaRPr lang="en-US" dirty="0"/>
           </a:p>
@@ -19960,7 +20050,7 @@
           <a:p>
             <a:fld id="{BF01ECED-6ECE-4989-B917-9D4D7E6D3C76}" type="datetime1">
               <a:rPr lang="en-US" smtClean="0"/>
-              <a:t>7/10/2023</a:t>
+              <a:t>7/11/2023</a:t>
             </a:fld>
             <a:endParaRPr lang="en-US" dirty="0"/>
           </a:p>
@@ -20245,7 +20335,7 @@
           <a:p>
             <a:fld id="{E3B570E1-CB40-488E-8C6F-EF4211DFFCB0}" type="datetime1">
               <a:rPr lang="en-US" smtClean="0"/>
-              <a:t>7/10/2023</a:t>
+              <a:t>7/11/2023</a:t>
             </a:fld>
             <a:endParaRPr lang="en-US" dirty="0"/>
           </a:p>
@@ -20520,7 +20610,7 @@
           <a:p>
             <a:fld id="{D1CEB6AF-9F5C-43BE-879E-CB9514111250}" type="datetime1">
               <a:rPr lang="en-US" smtClean="0"/>
-              <a:t>7/10/2023</a:t>
+              <a:t>7/11/2023</a:t>
             </a:fld>
             <a:endParaRPr lang="en-US" dirty="0"/>
           </a:p>
@@ -20765,7 +20855,7 @@
           <a:p>
             <a:fld id="{E7EE424C-FCA3-4EDD-B274-8E055D649B7D}" type="datetime1">
               <a:rPr lang="en-US" smtClean="0"/>
-              <a:t>7/10/2023</a:t>
+              <a:t>7/11/2023</a:t>
             </a:fld>
             <a:endParaRPr lang="en-US" dirty="0"/>
           </a:p>
@@ -21589,6 +21679,1041 @@
 </p:sld>
 </file>
 
+<file path=ppt/slides/slide10.xml><?xml version="1.0" encoding="utf-8"?>
+<p:sld xmlns:a="http://schemas.openxmlformats.org/drawingml/2006/main" xmlns:r="http://schemas.openxmlformats.org/officeDocument/2006/relationships" xmlns:p="http://schemas.openxmlformats.org/presentationml/2006/main">
+  <p:cSld>
+    <p:spTree>
+      <p:nvGrpSpPr>
+        <p:cNvPr id="1" name=""/>
+        <p:cNvGrpSpPr/>
+        <p:nvPr/>
+      </p:nvGrpSpPr>
+      <p:grpSpPr>
+        <a:xfrm>
+          <a:off x="0" y="0"/>
+          <a:ext cx="0" cy="0"/>
+          <a:chOff x="0" y="0"/>
+          <a:chExt cx="0" cy="0"/>
+        </a:xfrm>
+      </p:grpSpPr>
+      <p:pic>
+        <p:nvPicPr>
+          <p:cNvPr id="7" name="Picture 6">
+            <a:extLst>
+              <a:ext uri="{FF2B5EF4-FFF2-40B4-BE49-F238E27FC236}">
+                <a16:creationId xmlns:a16="http://schemas.microsoft.com/office/drawing/2014/main" id="{37A11094-F96C-C4D4-E5AF-F0FFF2A98DD9}"/>
+              </a:ext>
+            </a:extLst>
+          </p:cNvPr>
+          <p:cNvPicPr>
+            <a:picLocks noChangeAspect="1"/>
+          </p:cNvPicPr>
+          <p:nvPr/>
+        </p:nvPicPr>
+        <p:blipFill>
+          <a:blip r:embed="rId3" cstate="email">
+            <a:extLst>
+              <a:ext uri="{28A0092B-C50C-407E-A947-70E740481C1C}">
+                <a14:useLocalDpi xmlns:a14="http://schemas.microsoft.com/office/drawing/2010/main"/>
+              </a:ext>
+            </a:extLst>
+          </a:blip>
+          <a:stretch>
+            <a:fillRect/>
+          </a:stretch>
+        </p:blipFill>
+        <p:spPr>
+          <a:xfrm>
+            <a:off x="40362" y="0"/>
+            <a:ext cx="12111276" cy="6858000"/>
+          </a:xfrm>
+          <a:prstGeom prst="rect">
+            <a:avLst/>
+          </a:prstGeom>
+        </p:spPr>
+      </p:pic>
+    </p:spTree>
+    <p:extLst>
+      <p:ext uri="{BB962C8B-B14F-4D97-AF65-F5344CB8AC3E}">
+        <p14:creationId xmlns:p14="http://schemas.microsoft.com/office/powerpoint/2010/main" val="4063832219"/>
+      </p:ext>
+    </p:extLst>
+  </p:cSld>
+  <p:clrMapOvr>
+    <a:masterClrMapping/>
+  </p:clrMapOvr>
+</p:sld>
+</file>
+
+<file path=ppt/slides/slide11.xml><?xml version="1.0" encoding="utf-8"?>
+<p:sld xmlns:a="http://schemas.openxmlformats.org/drawingml/2006/main" xmlns:r="http://schemas.openxmlformats.org/officeDocument/2006/relationships" xmlns:p="http://schemas.openxmlformats.org/presentationml/2006/main">
+  <p:cSld>
+    <p:spTree>
+      <p:nvGrpSpPr>
+        <p:cNvPr id="1" name=""/>
+        <p:cNvGrpSpPr/>
+        <p:nvPr/>
+      </p:nvGrpSpPr>
+      <p:grpSpPr>
+        <a:xfrm>
+          <a:off x="0" y="0"/>
+          <a:ext cx="0" cy="0"/>
+          <a:chOff x="0" y="0"/>
+          <a:chExt cx="0" cy="0"/>
+        </a:xfrm>
+      </p:grpSpPr>
+      <p:sp>
+        <p:nvSpPr>
+          <p:cNvPr id="2" name="Title 1">
+            <a:extLst>
+              <a:ext uri="{FF2B5EF4-FFF2-40B4-BE49-F238E27FC236}">
+                <a16:creationId xmlns:a16="http://schemas.microsoft.com/office/drawing/2014/main" id="{3F45DFDF-CE8B-3994-698F-EBEDCA4C38D5}"/>
+              </a:ext>
+            </a:extLst>
+          </p:cNvPr>
+          <p:cNvSpPr>
+            <a:spLocks noGrp="1"/>
+          </p:cNvSpPr>
+          <p:nvPr>
+            <p:ph type="title"/>
+          </p:nvPr>
+        </p:nvSpPr>
+        <p:spPr/>
+        <p:txBody>
+          <a:bodyPr/>
+          <a:lstStyle/>
+          <a:p>
+            <a:r>
+              <a:rPr lang="en-US" dirty="0"/>
+              <a:t>Future data projects</a:t>
+            </a:r>
+          </a:p>
+        </p:txBody>
+      </p:sp>
+      <p:sp>
+        <p:nvSpPr>
+          <p:cNvPr id="6" name="Content Placeholder 2">
+            <a:extLst>
+              <a:ext uri="{FF2B5EF4-FFF2-40B4-BE49-F238E27FC236}">
+                <a16:creationId xmlns:a16="http://schemas.microsoft.com/office/drawing/2014/main" id="{D6D55383-C77C-549E-F8B1-41E31D1CCA01}"/>
+              </a:ext>
+            </a:extLst>
+          </p:cNvPr>
+          <p:cNvSpPr txBox="1">
+            <a:spLocks/>
+          </p:cNvSpPr>
+          <p:nvPr/>
+        </p:nvSpPr>
+        <p:spPr>
+          <a:xfrm>
+            <a:off x="847866" y="1990868"/>
+            <a:ext cx="7265762" cy="4023360"/>
+          </a:xfrm>
+          <a:prstGeom prst="rect">
+            <a:avLst/>
+          </a:prstGeom>
+        </p:spPr>
+        <p:txBody>
+          <a:bodyPr vert="horz" lIns="45720" tIns="45720" rIns="45720" bIns="45720" rtlCol="0">
+            <a:normAutofit/>
+          </a:bodyPr>
+          <a:lstStyle>
+            <a:lvl1pPr marL="91440" indent="-91440" algn="l" defTabSz="914400" rtl="0" eaLnBrk="1" latinLnBrk="0" hangingPunct="1">
+              <a:lnSpc>
+                <a:spcPct val="90000"/>
+              </a:lnSpc>
+              <a:spcBef>
+                <a:spcPts val="1200"/>
+              </a:spcBef>
+              <a:spcAft>
+                <a:spcPts val="200"/>
+              </a:spcAft>
+              <a:buClr>
+                <a:schemeClr val="accent1"/>
+              </a:buClr>
+              <a:buSzPct val="100000"/>
+              <a:buFont typeface="Tw Cen MT" panose="020B0602020104020603" pitchFamily="34" charset="0"/>
+              <a:buChar char=" "/>
+              <a:defRPr sz="2200" kern="1200">
+                <a:solidFill>
+                  <a:schemeClr val="tx1"/>
+                </a:solidFill>
+                <a:latin typeface="+mn-lt"/>
+                <a:ea typeface="+mn-ea"/>
+                <a:cs typeface="+mn-cs"/>
+              </a:defRPr>
+            </a:lvl1pPr>
+            <a:lvl2pPr marL="265176" indent="-137160" algn="l" defTabSz="914400" rtl="0" eaLnBrk="1" latinLnBrk="0" hangingPunct="1">
+              <a:lnSpc>
+                <a:spcPct val="90000"/>
+              </a:lnSpc>
+              <a:spcBef>
+                <a:spcPts val="200"/>
+              </a:spcBef>
+              <a:spcAft>
+                <a:spcPts val="400"/>
+              </a:spcAft>
+              <a:buClr>
+                <a:schemeClr val="accent1"/>
+              </a:buClr>
+              <a:buFont typeface="Wingdings 3" pitchFamily="18" charset="2"/>
+              <a:buChar char=""/>
+              <a:defRPr sz="1800" kern="1200">
+                <a:solidFill>
+                  <a:schemeClr val="tx1"/>
+                </a:solidFill>
+                <a:latin typeface="+mn-lt"/>
+                <a:ea typeface="+mn-ea"/>
+                <a:cs typeface="+mn-cs"/>
+              </a:defRPr>
+            </a:lvl2pPr>
+            <a:lvl3pPr marL="448056" indent="-137160" algn="l" defTabSz="914400" rtl="0" eaLnBrk="1" latinLnBrk="0" hangingPunct="1">
+              <a:lnSpc>
+                <a:spcPct val="90000"/>
+              </a:lnSpc>
+              <a:spcBef>
+                <a:spcPts val="200"/>
+              </a:spcBef>
+              <a:spcAft>
+                <a:spcPts val="400"/>
+              </a:spcAft>
+              <a:buClr>
+                <a:schemeClr val="accent1"/>
+              </a:buClr>
+              <a:buFont typeface="Wingdings 3" pitchFamily="18" charset="2"/>
+              <a:buChar char=""/>
+              <a:defRPr sz="1400" kern="1200">
+                <a:solidFill>
+                  <a:schemeClr val="tx1"/>
+                </a:solidFill>
+                <a:latin typeface="+mn-lt"/>
+                <a:ea typeface="+mn-ea"/>
+                <a:cs typeface="+mn-cs"/>
+              </a:defRPr>
+            </a:lvl3pPr>
+            <a:lvl4pPr marL="594360" indent="-137160" algn="l" defTabSz="914400" rtl="0" eaLnBrk="1" latinLnBrk="0" hangingPunct="1">
+              <a:lnSpc>
+                <a:spcPct val="90000"/>
+              </a:lnSpc>
+              <a:spcBef>
+                <a:spcPts val="200"/>
+              </a:spcBef>
+              <a:spcAft>
+                <a:spcPts val="400"/>
+              </a:spcAft>
+              <a:buClr>
+                <a:schemeClr val="accent1"/>
+              </a:buClr>
+              <a:buFont typeface="Wingdings 3" pitchFamily="18" charset="2"/>
+              <a:buChar char=""/>
+              <a:defRPr sz="1400" kern="1200">
+                <a:solidFill>
+                  <a:schemeClr val="tx1"/>
+                </a:solidFill>
+                <a:latin typeface="+mn-lt"/>
+                <a:ea typeface="+mn-ea"/>
+                <a:cs typeface="+mn-cs"/>
+              </a:defRPr>
+            </a:lvl4pPr>
+            <a:lvl5pPr marL="777240" indent="-137160" algn="l" defTabSz="914400" rtl="0" eaLnBrk="1" latinLnBrk="0" hangingPunct="1">
+              <a:lnSpc>
+                <a:spcPct val="90000"/>
+              </a:lnSpc>
+              <a:spcBef>
+                <a:spcPts val="200"/>
+              </a:spcBef>
+              <a:spcAft>
+                <a:spcPts val="400"/>
+              </a:spcAft>
+              <a:buClr>
+                <a:schemeClr val="accent1"/>
+              </a:buClr>
+              <a:buFont typeface="Wingdings 3" pitchFamily="18" charset="2"/>
+              <a:buChar char=""/>
+              <a:defRPr sz="1400" kern="1200">
+                <a:solidFill>
+                  <a:schemeClr val="tx1"/>
+                </a:solidFill>
+                <a:latin typeface="+mn-lt"/>
+                <a:ea typeface="+mn-ea"/>
+                <a:cs typeface="+mn-cs"/>
+              </a:defRPr>
+            </a:lvl5pPr>
+            <a:lvl6pPr marL="914400" indent="-137160" algn="l" defTabSz="914400" rtl="0" eaLnBrk="1" latinLnBrk="0" hangingPunct="1">
+              <a:lnSpc>
+                <a:spcPct val="90000"/>
+              </a:lnSpc>
+              <a:spcBef>
+                <a:spcPts val="200"/>
+              </a:spcBef>
+              <a:spcAft>
+                <a:spcPts val="400"/>
+              </a:spcAft>
+              <a:buClr>
+                <a:schemeClr val="accent1"/>
+              </a:buClr>
+              <a:buFont typeface="Wingdings 3" pitchFamily="18" charset="2"/>
+              <a:buChar char=""/>
+              <a:defRPr sz="1400" kern="1200">
+                <a:solidFill>
+                  <a:schemeClr val="tx1"/>
+                </a:solidFill>
+                <a:latin typeface="+mn-lt"/>
+                <a:ea typeface="+mn-ea"/>
+                <a:cs typeface="+mn-cs"/>
+              </a:defRPr>
+            </a:lvl6pPr>
+            <a:lvl7pPr marL="1060704" indent="-137160" algn="l" defTabSz="914400" rtl="0" eaLnBrk="1" latinLnBrk="0" hangingPunct="1">
+              <a:lnSpc>
+                <a:spcPct val="90000"/>
+              </a:lnSpc>
+              <a:spcBef>
+                <a:spcPts val="200"/>
+              </a:spcBef>
+              <a:spcAft>
+                <a:spcPts val="400"/>
+              </a:spcAft>
+              <a:buClr>
+                <a:schemeClr val="accent1"/>
+              </a:buClr>
+              <a:buFont typeface="Wingdings 3" pitchFamily="18" charset="2"/>
+              <a:buChar char=""/>
+              <a:defRPr sz="1400" kern="1200">
+                <a:solidFill>
+                  <a:schemeClr val="tx1"/>
+                </a:solidFill>
+                <a:latin typeface="+mn-lt"/>
+                <a:ea typeface="+mn-ea"/>
+                <a:cs typeface="+mn-cs"/>
+              </a:defRPr>
+            </a:lvl7pPr>
+            <a:lvl8pPr marL="1216152" indent="-137160" algn="l" defTabSz="914400" rtl="0" eaLnBrk="1" latinLnBrk="0" hangingPunct="1">
+              <a:lnSpc>
+                <a:spcPct val="90000"/>
+              </a:lnSpc>
+              <a:spcBef>
+                <a:spcPts val="200"/>
+              </a:spcBef>
+              <a:spcAft>
+                <a:spcPts val="400"/>
+              </a:spcAft>
+              <a:buClr>
+                <a:schemeClr val="accent1"/>
+              </a:buClr>
+              <a:buFont typeface="Wingdings 3" pitchFamily="18" charset="2"/>
+              <a:buChar char=""/>
+              <a:defRPr sz="1400" kern="1200">
+                <a:solidFill>
+                  <a:schemeClr val="tx1"/>
+                </a:solidFill>
+                <a:latin typeface="+mn-lt"/>
+                <a:ea typeface="+mn-ea"/>
+                <a:cs typeface="+mn-cs"/>
+              </a:defRPr>
+            </a:lvl8pPr>
+            <a:lvl9pPr marL="1362456" indent="-137160" algn="l" defTabSz="914400" rtl="0" eaLnBrk="1" latinLnBrk="0" hangingPunct="1">
+              <a:lnSpc>
+                <a:spcPct val="90000"/>
+              </a:lnSpc>
+              <a:spcBef>
+                <a:spcPts val="200"/>
+              </a:spcBef>
+              <a:spcAft>
+                <a:spcPts val="400"/>
+              </a:spcAft>
+              <a:buClr>
+                <a:schemeClr val="accent1"/>
+              </a:buClr>
+              <a:buFont typeface="Wingdings 3" pitchFamily="18" charset="2"/>
+              <a:buChar char=""/>
+              <a:defRPr sz="1400" kern="1200">
+                <a:solidFill>
+                  <a:schemeClr val="tx1"/>
+                </a:solidFill>
+                <a:latin typeface="+mn-lt"/>
+                <a:ea typeface="+mn-ea"/>
+                <a:cs typeface="+mn-cs"/>
+              </a:defRPr>
+            </a:lvl9pPr>
+          </a:lstStyle>
+          <a:p>
+            <a:pPr marL="285750" indent="-285750">
+              <a:buFont typeface="Arial" panose="020B0604020202020204" pitchFamily="34" charset="0"/>
+              <a:buChar char="•"/>
+            </a:pPr>
+            <a:r>
+              <a:rPr lang="en-US" sz="2000" dirty="0"/>
+              <a:t>Cross-reference with different classification dataset</a:t>
+            </a:r>
+          </a:p>
+          <a:p>
+            <a:pPr marL="285750" indent="-285750">
+              <a:buFont typeface="Arial" panose="020B0604020202020204" pitchFamily="34" charset="0"/>
+              <a:buChar char="•"/>
+            </a:pPr>
+            <a:r>
+              <a:rPr lang="en-US" sz="2000" dirty="0"/>
+              <a:t>Correlation between economic situation and missile tests</a:t>
+            </a:r>
+          </a:p>
+          <a:p>
+            <a:pPr marL="285750" indent="-285750">
+              <a:buFont typeface="Arial" panose="020B0604020202020204" pitchFamily="34" charset="0"/>
+              <a:buChar char="•"/>
+            </a:pPr>
+            <a:r>
+              <a:rPr lang="en-US" sz="2000" dirty="0"/>
+              <a:t>Find DPRK ‘internal’ information releases regarding tests</a:t>
+            </a:r>
+          </a:p>
+          <a:p>
+            <a:pPr marL="285750" indent="-285750">
+              <a:buFont typeface="Arial" panose="020B0604020202020204" pitchFamily="34" charset="0"/>
+              <a:buChar char="•"/>
+            </a:pPr>
+            <a:r>
+              <a:rPr lang="en-US" sz="2000" dirty="0"/>
+              <a:t>Analyze political imprisonment data and missile capabilities</a:t>
+            </a:r>
+          </a:p>
+          <a:p>
+            <a:pPr marL="285750" indent="-285750">
+              <a:buFont typeface="Arial" panose="020B0604020202020204" pitchFamily="34" charset="0"/>
+              <a:buChar char="•"/>
+            </a:pPr>
+            <a:endParaRPr lang="en-US" sz="2000" dirty="0"/>
+          </a:p>
+          <a:p>
+            <a:pPr marL="285750" indent="-285750">
+              <a:buFont typeface="Arial" panose="020B0604020202020204" pitchFamily="34" charset="0"/>
+              <a:buChar char="•"/>
+            </a:pPr>
+            <a:endParaRPr lang="en-US" sz="2000" dirty="0"/>
+          </a:p>
+          <a:p>
+            <a:pPr marL="285750" indent="-285750">
+              <a:buFont typeface="Arial" panose="020B0604020202020204" pitchFamily="34" charset="0"/>
+              <a:buChar char="•"/>
+            </a:pPr>
+            <a:endParaRPr lang="en-US" sz="2000" dirty="0"/>
+          </a:p>
+        </p:txBody>
+      </p:sp>
+      <p:sp>
+        <p:nvSpPr>
+          <p:cNvPr id="7" name="Arrow: Down 6">
+            <a:extLst>
+              <a:ext uri="{FF2B5EF4-FFF2-40B4-BE49-F238E27FC236}">
+                <a16:creationId xmlns:a16="http://schemas.microsoft.com/office/drawing/2014/main" id="{4677C2B0-033A-D0F7-6BA4-188B9A496E72}"/>
+              </a:ext>
+            </a:extLst>
+          </p:cNvPr>
+          <p:cNvSpPr/>
+          <p:nvPr/>
+        </p:nvSpPr>
+        <p:spPr>
+          <a:xfrm>
+            <a:off x="3175718" y="3952001"/>
+            <a:ext cx="961534" cy="933253"/>
+          </a:xfrm>
+          <a:prstGeom prst="downArrow">
+            <a:avLst/>
+          </a:prstGeom>
+        </p:spPr>
+        <p:style>
+          <a:lnRef idx="2">
+            <a:schemeClr val="accent1">
+              <a:shade val="15000"/>
+            </a:schemeClr>
+          </a:lnRef>
+          <a:fillRef idx="1">
+            <a:schemeClr val="accent1"/>
+          </a:fillRef>
+          <a:effectRef idx="0">
+            <a:schemeClr val="accent1"/>
+          </a:effectRef>
+          <a:fontRef idx="minor">
+            <a:schemeClr val="lt1"/>
+          </a:fontRef>
+        </p:style>
+        <p:txBody>
+          <a:bodyPr rtlCol="0" anchor="ctr"/>
+          <a:lstStyle/>
+          <a:p>
+            <a:pPr algn="ctr"/>
+            <a:endParaRPr lang="en-US"/>
+          </a:p>
+        </p:txBody>
+      </p:sp>
+      <p:sp>
+        <p:nvSpPr>
+          <p:cNvPr id="8" name="TextBox 7">
+            <a:extLst>
+              <a:ext uri="{FF2B5EF4-FFF2-40B4-BE49-F238E27FC236}">
+                <a16:creationId xmlns:a16="http://schemas.microsoft.com/office/drawing/2014/main" id="{49E47D42-794E-E906-6632-9BFCBB33B884}"/>
+              </a:ext>
+            </a:extLst>
+          </p:cNvPr>
+          <p:cNvSpPr txBox="1"/>
+          <p:nvPr/>
+        </p:nvSpPr>
+        <p:spPr>
+          <a:xfrm>
+            <a:off x="708646" y="4974856"/>
+            <a:ext cx="6094428" cy="954107"/>
+          </a:xfrm>
+          <a:prstGeom prst="rect">
+            <a:avLst/>
+          </a:prstGeom>
+          <a:noFill/>
+        </p:spPr>
+        <p:txBody>
+          <a:bodyPr wrap="square">
+            <a:spAutoFit/>
+          </a:bodyPr>
+          <a:lstStyle/>
+          <a:p>
+            <a:pPr algn="ctr"/>
+            <a:r>
+              <a:rPr lang="en-US" sz="2800" b="1" dirty="0">
+                <a:solidFill>
+                  <a:schemeClr val="tx1"/>
+                </a:solidFill>
+              </a:rPr>
+              <a:t>E</a:t>
+            </a:r>
+            <a:r>
+              <a:rPr lang="en-US" sz="2800" b="1" dirty="0"/>
+              <a:t>xploit target audiences &amp;</a:t>
+            </a:r>
+          </a:p>
+          <a:p>
+            <a:pPr algn="ctr"/>
+            <a:r>
+              <a:rPr lang="en-US" sz="2800" b="1" dirty="0">
+                <a:solidFill>
+                  <a:schemeClr val="tx1"/>
+                </a:solidFill>
+              </a:rPr>
+              <a:t>Induce de</a:t>
+            </a:r>
+            <a:r>
+              <a:rPr lang="en-US" sz="2800" b="1" dirty="0"/>
+              <a:t>sired behavior</a:t>
+            </a:r>
+            <a:endParaRPr lang="en-US" sz="2400" b="1" dirty="0">
+              <a:solidFill>
+                <a:schemeClr val="tx1"/>
+              </a:solidFill>
+            </a:endParaRPr>
+          </a:p>
+        </p:txBody>
+      </p:sp>
+      <p:pic>
+        <p:nvPicPr>
+          <p:cNvPr id="2050" name="Picture 2" descr="100 Insightful Quotes on Influence - FocusU">
+            <a:extLst>
+              <a:ext uri="{FF2B5EF4-FFF2-40B4-BE49-F238E27FC236}">
+                <a16:creationId xmlns:a16="http://schemas.microsoft.com/office/drawing/2014/main" id="{B0D6E120-5BA8-8A15-2326-083164DE0B47}"/>
+              </a:ext>
+            </a:extLst>
+          </p:cNvPr>
+          <p:cNvPicPr>
+            <a:picLocks noChangeAspect="1" noChangeArrowheads="1"/>
+          </p:cNvPicPr>
+          <p:nvPr/>
+        </p:nvPicPr>
+        <p:blipFill rotWithShape="1">
+          <a:blip r:embed="rId2">
+            <a:extLst>
+              <a:ext uri="{28A0092B-C50C-407E-A947-70E740481C1C}">
+                <a14:useLocalDpi xmlns:a14="http://schemas.microsoft.com/office/drawing/2010/main" val="0"/>
+              </a:ext>
+            </a:extLst>
+          </a:blip>
+          <a:srcRect l="5478" t="940" r="8625" b="2140"/>
+          <a:stretch/>
+        </p:blipFill>
+        <p:spPr bwMode="auto">
+          <a:xfrm>
+            <a:off x="7598004" y="2387390"/>
+            <a:ext cx="3720986" cy="2372508"/>
+          </a:xfrm>
+          <a:prstGeom prst="rect">
+            <a:avLst/>
+          </a:prstGeom>
+          <a:noFill/>
+          <a:extLst>
+            <a:ext uri="{909E8E84-426E-40DD-AFC4-6F175D3DCCD1}">
+              <a14:hiddenFill xmlns:a14="http://schemas.microsoft.com/office/drawing/2010/main">
+                <a:solidFill>
+                  <a:srgbClr val="FFFFFF"/>
+                </a:solidFill>
+              </a14:hiddenFill>
+            </a:ext>
+          </a:extLst>
+        </p:spPr>
+      </p:pic>
+    </p:spTree>
+    <p:extLst>
+      <p:ext uri="{BB962C8B-B14F-4D97-AF65-F5344CB8AC3E}">
+        <p14:creationId xmlns:p14="http://schemas.microsoft.com/office/powerpoint/2010/main" val="2520221122"/>
+      </p:ext>
+    </p:extLst>
+  </p:cSld>
+  <p:clrMapOvr>
+    <a:masterClrMapping/>
+  </p:clrMapOvr>
+</p:sld>
+</file>
+
+<file path=ppt/slides/slide12.xml><?xml version="1.0" encoding="utf-8"?>
+<p:sld xmlns:a="http://schemas.openxmlformats.org/drawingml/2006/main" xmlns:r="http://schemas.openxmlformats.org/officeDocument/2006/relationships" xmlns:p="http://schemas.openxmlformats.org/presentationml/2006/main">
+  <p:cSld>
+    <p:spTree>
+      <p:nvGrpSpPr>
+        <p:cNvPr id="1" name=""/>
+        <p:cNvGrpSpPr/>
+        <p:nvPr/>
+      </p:nvGrpSpPr>
+      <p:grpSpPr>
+        <a:xfrm>
+          <a:off x="0" y="0"/>
+          <a:ext cx="0" cy="0"/>
+          <a:chOff x="0" y="0"/>
+          <a:chExt cx="0" cy="0"/>
+        </a:xfrm>
+      </p:grpSpPr>
+      <p:sp>
+        <p:nvSpPr>
+          <p:cNvPr id="2" name="Title 1">
+            <a:extLst>
+              <a:ext uri="{FF2B5EF4-FFF2-40B4-BE49-F238E27FC236}">
+                <a16:creationId xmlns:a16="http://schemas.microsoft.com/office/drawing/2014/main" id="{EFEAC506-57F9-9A4C-7719-6B93B70329CE}"/>
+              </a:ext>
+            </a:extLst>
+          </p:cNvPr>
+          <p:cNvSpPr>
+            <a:spLocks noGrp="1"/>
+          </p:cNvSpPr>
+          <p:nvPr>
+            <p:ph type="title"/>
+          </p:nvPr>
+        </p:nvSpPr>
+        <p:spPr/>
+        <p:txBody>
+          <a:bodyPr/>
+          <a:lstStyle/>
+          <a:p>
+            <a:r>
+              <a:rPr lang="en-US" dirty="0"/>
+              <a:t>Contact, GitHub &amp; dataset information</a:t>
+            </a:r>
+          </a:p>
+        </p:txBody>
+      </p:sp>
+      <p:sp>
+        <p:nvSpPr>
+          <p:cNvPr id="8" name="Content Placeholder 2">
+            <a:extLst>
+              <a:ext uri="{FF2B5EF4-FFF2-40B4-BE49-F238E27FC236}">
+                <a16:creationId xmlns:a16="http://schemas.microsoft.com/office/drawing/2014/main" id="{AFEF02E6-5DFD-7D37-99DB-EFCC23C17BAE}"/>
+              </a:ext>
+            </a:extLst>
+          </p:cNvPr>
+          <p:cNvSpPr txBox="1">
+            <a:spLocks/>
+          </p:cNvSpPr>
+          <p:nvPr/>
+        </p:nvSpPr>
+        <p:spPr>
+          <a:xfrm>
+            <a:off x="892153" y="2084832"/>
+            <a:ext cx="5602915" cy="4023360"/>
+          </a:xfrm>
+          <a:prstGeom prst="rect">
+            <a:avLst/>
+          </a:prstGeom>
+        </p:spPr>
+        <p:txBody>
+          <a:bodyPr vert="horz" lIns="45720" tIns="45720" rIns="45720" bIns="45720" rtlCol="0">
+            <a:normAutofit/>
+          </a:bodyPr>
+          <a:lstStyle>
+            <a:lvl1pPr marL="91440" indent="-91440" algn="l" defTabSz="914400" rtl="0" eaLnBrk="1" latinLnBrk="0" hangingPunct="1">
+              <a:lnSpc>
+                <a:spcPct val="90000"/>
+              </a:lnSpc>
+              <a:spcBef>
+                <a:spcPts val="1200"/>
+              </a:spcBef>
+              <a:spcAft>
+                <a:spcPts val="200"/>
+              </a:spcAft>
+              <a:buClr>
+                <a:schemeClr val="accent1"/>
+              </a:buClr>
+              <a:buSzPct val="100000"/>
+              <a:buFont typeface="Tw Cen MT" panose="020B0602020104020603" pitchFamily="34" charset="0"/>
+              <a:buChar char=" "/>
+              <a:defRPr sz="2200" kern="1200">
+                <a:solidFill>
+                  <a:schemeClr val="tx1"/>
+                </a:solidFill>
+                <a:latin typeface="+mn-lt"/>
+                <a:ea typeface="+mn-ea"/>
+                <a:cs typeface="+mn-cs"/>
+              </a:defRPr>
+            </a:lvl1pPr>
+            <a:lvl2pPr marL="265176" indent="-137160" algn="l" defTabSz="914400" rtl="0" eaLnBrk="1" latinLnBrk="0" hangingPunct="1">
+              <a:lnSpc>
+                <a:spcPct val="90000"/>
+              </a:lnSpc>
+              <a:spcBef>
+                <a:spcPts val="200"/>
+              </a:spcBef>
+              <a:spcAft>
+                <a:spcPts val="400"/>
+              </a:spcAft>
+              <a:buClr>
+                <a:schemeClr val="accent1"/>
+              </a:buClr>
+              <a:buFont typeface="Wingdings 3" pitchFamily="18" charset="2"/>
+              <a:buChar char=""/>
+              <a:defRPr sz="1800" kern="1200">
+                <a:solidFill>
+                  <a:schemeClr val="tx1"/>
+                </a:solidFill>
+                <a:latin typeface="+mn-lt"/>
+                <a:ea typeface="+mn-ea"/>
+                <a:cs typeface="+mn-cs"/>
+              </a:defRPr>
+            </a:lvl2pPr>
+            <a:lvl3pPr marL="448056" indent="-137160" algn="l" defTabSz="914400" rtl="0" eaLnBrk="1" latinLnBrk="0" hangingPunct="1">
+              <a:lnSpc>
+                <a:spcPct val="90000"/>
+              </a:lnSpc>
+              <a:spcBef>
+                <a:spcPts val="200"/>
+              </a:spcBef>
+              <a:spcAft>
+                <a:spcPts val="400"/>
+              </a:spcAft>
+              <a:buClr>
+                <a:schemeClr val="accent1"/>
+              </a:buClr>
+              <a:buFont typeface="Wingdings 3" pitchFamily="18" charset="2"/>
+              <a:buChar char=""/>
+              <a:defRPr sz="1400" kern="1200">
+                <a:solidFill>
+                  <a:schemeClr val="tx1"/>
+                </a:solidFill>
+                <a:latin typeface="+mn-lt"/>
+                <a:ea typeface="+mn-ea"/>
+                <a:cs typeface="+mn-cs"/>
+              </a:defRPr>
+            </a:lvl3pPr>
+            <a:lvl4pPr marL="594360" indent="-137160" algn="l" defTabSz="914400" rtl="0" eaLnBrk="1" latinLnBrk="0" hangingPunct="1">
+              <a:lnSpc>
+                <a:spcPct val="90000"/>
+              </a:lnSpc>
+              <a:spcBef>
+                <a:spcPts val="200"/>
+              </a:spcBef>
+              <a:spcAft>
+                <a:spcPts val="400"/>
+              </a:spcAft>
+              <a:buClr>
+                <a:schemeClr val="accent1"/>
+              </a:buClr>
+              <a:buFont typeface="Wingdings 3" pitchFamily="18" charset="2"/>
+              <a:buChar char=""/>
+              <a:defRPr sz="1400" kern="1200">
+                <a:solidFill>
+                  <a:schemeClr val="tx1"/>
+                </a:solidFill>
+                <a:latin typeface="+mn-lt"/>
+                <a:ea typeface="+mn-ea"/>
+                <a:cs typeface="+mn-cs"/>
+              </a:defRPr>
+            </a:lvl4pPr>
+            <a:lvl5pPr marL="777240" indent="-137160" algn="l" defTabSz="914400" rtl="0" eaLnBrk="1" latinLnBrk="0" hangingPunct="1">
+              <a:lnSpc>
+                <a:spcPct val="90000"/>
+              </a:lnSpc>
+              <a:spcBef>
+                <a:spcPts val="200"/>
+              </a:spcBef>
+              <a:spcAft>
+                <a:spcPts val="400"/>
+              </a:spcAft>
+              <a:buClr>
+                <a:schemeClr val="accent1"/>
+              </a:buClr>
+              <a:buFont typeface="Wingdings 3" pitchFamily="18" charset="2"/>
+              <a:buChar char=""/>
+              <a:defRPr sz="1400" kern="1200">
+                <a:solidFill>
+                  <a:schemeClr val="tx1"/>
+                </a:solidFill>
+                <a:latin typeface="+mn-lt"/>
+                <a:ea typeface="+mn-ea"/>
+                <a:cs typeface="+mn-cs"/>
+              </a:defRPr>
+            </a:lvl5pPr>
+            <a:lvl6pPr marL="914400" indent="-137160" algn="l" defTabSz="914400" rtl="0" eaLnBrk="1" latinLnBrk="0" hangingPunct="1">
+              <a:lnSpc>
+                <a:spcPct val="90000"/>
+              </a:lnSpc>
+              <a:spcBef>
+                <a:spcPts val="200"/>
+              </a:spcBef>
+              <a:spcAft>
+                <a:spcPts val="400"/>
+              </a:spcAft>
+              <a:buClr>
+                <a:schemeClr val="accent1"/>
+              </a:buClr>
+              <a:buFont typeface="Wingdings 3" pitchFamily="18" charset="2"/>
+              <a:buChar char=""/>
+              <a:defRPr sz="1400" kern="1200">
+                <a:solidFill>
+                  <a:schemeClr val="tx1"/>
+                </a:solidFill>
+                <a:latin typeface="+mn-lt"/>
+                <a:ea typeface="+mn-ea"/>
+                <a:cs typeface="+mn-cs"/>
+              </a:defRPr>
+            </a:lvl6pPr>
+            <a:lvl7pPr marL="1060704" indent="-137160" algn="l" defTabSz="914400" rtl="0" eaLnBrk="1" latinLnBrk="0" hangingPunct="1">
+              <a:lnSpc>
+                <a:spcPct val="90000"/>
+              </a:lnSpc>
+              <a:spcBef>
+                <a:spcPts val="200"/>
+              </a:spcBef>
+              <a:spcAft>
+                <a:spcPts val="400"/>
+              </a:spcAft>
+              <a:buClr>
+                <a:schemeClr val="accent1"/>
+              </a:buClr>
+              <a:buFont typeface="Wingdings 3" pitchFamily="18" charset="2"/>
+              <a:buChar char=""/>
+              <a:defRPr sz="1400" kern="1200">
+                <a:solidFill>
+                  <a:schemeClr val="tx1"/>
+                </a:solidFill>
+                <a:latin typeface="+mn-lt"/>
+                <a:ea typeface="+mn-ea"/>
+                <a:cs typeface="+mn-cs"/>
+              </a:defRPr>
+            </a:lvl7pPr>
+            <a:lvl8pPr marL="1216152" indent="-137160" algn="l" defTabSz="914400" rtl="0" eaLnBrk="1" latinLnBrk="0" hangingPunct="1">
+              <a:lnSpc>
+                <a:spcPct val="90000"/>
+              </a:lnSpc>
+              <a:spcBef>
+                <a:spcPts val="200"/>
+              </a:spcBef>
+              <a:spcAft>
+                <a:spcPts val="400"/>
+              </a:spcAft>
+              <a:buClr>
+                <a:schemeClr val="accent1"/>
+              </a:buClr>
+              <a:buFont typeface="Wingdings 3" pitchFamily="18" charset="2"/>
+              <a:buChar char=""/>
+              <a:defRPr sz="1400" kern="1200">
+                <a:solidFill>
+                  <a:schemeClr val="tx1"/>
+                </a:solidFill>
+                <a:latin typeface="+mn-lt"/>
+                <a:ea typeface="+mn-ea"/>
+                <a:cs typeface="+mn-cs"/>
+              </a:defRPr>
+            </a:lvl8pPr>
+            <a:lvl9pPr marL="1362456" indent="-137160" algn="l" defTabSz="914400" rtl="0" eaLnBrk="1" latinLnBrk="0" hangingPunct="1">
+              <a:lnSpc>
+                <a:spcPct val="90000"/>
+              </a:lnSpc>
+              <a:spcBef>
+                <a:spcPts val="200"/>
+              </a:spcBef>
+              <a:spcAft>
+                <a:spcPts val="400"/>
+              </a:spcAft>
+              <a:buClr>
+                <a:schemeClr val="accent1"/>
+              </a:buClr>
+              <a:buFont typeface="Wingdings 3" pitchFamily="18" charset="2"/>
+              <a:buChar char=""/>
+              <a:defRPr sz="1400" kern="1200">
+                <a:solidFill>
+                  <a:schemeClr val="tx1"/>
+                </a:solidFill>
+                <a:latin typeface="+mn-lt"/>
+                <a:ea typeface="+mn-ea"/>
+                <a:cs typeface="+mn-cs"/>
+              </a:defRPr>
+            </a:lvl9pPr>
+          </a:lstStyle>
+          <a:p>
+            <a:pPr marL="285750" indent="-285750">
+              <a:buFont typeface="Arial" panose="020B0604020202020204" pitchFamily="34" charset="0"/>
+              <a:buChar char="•"/>
+            </a:pPr>
+            <a:r>
+              <a:rPr lang="en-US" sz="2400" dirty="0"/>
+              <a:t>Contact</a:t>
+            </a:r>
+          </a:p>
+          <a:p>
+            <a:pPr marL="459486" lvl="1" indent="-285750">
+              <a:buFont typeface="Arial" panose="020B0604020202020204" pitchFamily="34" charset="0"/>
+              <a:buChar char="•"/>
+            </a:pPr>
+            <a:r>
+              <a:rPr lang="en-US" dirty="0"/>
+              <a:t>YJ Kim: </a:t>
+            </a:r>
+            <a:r>
+              <a:rPr lang="en-US" dirty="0">
+                <a:hlinkClick r:id="rId2"/>
+              </a:rPr>
+              <a:t>princetonlaw@pm.com</a:t>
+            </a:r>
+            <a:endParaRPr lang="en-US" dirty="0"/>
+          </a:p>
+          <a:p>
+            <a:pPr marL="459486" lvl="1" indent="-285750">
+              <a:buFont typeface="Arial" panose="020B0604020202020204" pitchFamily="34" charset="0"/>
+              <a:buChar char="•"/>
+            </a:pPr>
+            <a:endParaRPr lang="en-US" dirty="0"/>
+          </a:p>
+          <a:p>
+            <a:pPr marL="285750" indent="-285750">
+              <a:buFont typeface="Arial" panose="020B0604020202020204" pitchFamily="34" charset="0"/>
+              <a:buChar char="•"/>
+            </a:pPr>
+            <a:r>
+              <a:rPr lang="en-US" sz="2400" dirty="0"/>
+              <a:t>GitHub repository:</a:t>
+            </a:r>
+          </a:p>
+          <a:p>
+            <a:pPr marL="459486" lvl="1" indent="-285750">
+              <a:buFont typeface="Arial" panose="020B0604020202020204" pitchFamily="34" charset="0"/>
+              <a:buChar char="•"/>
+            </a:pPr>
+            <a:r>
+              <a:rPr lang="en-US" dirty="0">
+                <a:hlinkClick r:id="rId3"/>
+              </a:rPr>
+              <a:t>https://github.com/mesege1/dprk_missile_stats</a:t>
+            </a:r>
+            <a:endParaRPr lang="en-US" dirty="0"/>
+          </a:p>
+          <a:p>
+            <a:pPr marL="459486" lvl="1" indent="-285750">
+              <a:buFont typeface="Arial" panose="020B0604020202020204" pitchFamily="34" charset="0"/>
+              <a:buChar char="•"/>
+            </a:pPr>
+            <a:endParaRPr lang="en-US" dirty="0"/>
+          </a:p>
+          <a:p>
+            <a:pPr marL="285750" indent="-285750">
+              <a:buFont typeface="Arial" panose="020B0604020202020204" pitchFamily="34" charset="0"/>
+              <a:buChar char="•"/>
+            </a:pPr>
+            <a:r>
+              <a:rPr lang="en-US" sz="2400" dirty="0"/>
+              <a:t>Data source:</a:t>
+            </a:r>
+          </a:p>
+          <a:p>
+            <a:pPr marL="459486" lvl="1" indent="-285750">
+              <a:buFont typeface="Arial" panose="020B0604020202020204" pitchFamily="34" charset="0"/>
+              <a:buChar char="•"/>
+            </a:pPr>
+            <a:r>
+              <a:rPr lang="en-US" dirty="0">
+                <a:hlinkClick r:id="rId4"/>
+              </a:rPr>
+              <a:t>https://www.nti.org/analysis/articles/cns-north-korea-missile-test-database/</a:t>
+            </a:r>
+            <a:endParaRPr lang="en-US" dirty="0"/>
+          </a:p>
+          <a:p>
+            <a:pPr marL="459486" lvl="1" indent="-285750">
+              <a:buFont typeface="Arial" panose="020B0604020202020204" pitchFamily="34" charset="0"/>
+              <a:buChar char="•"/>
+            </a:pPr>
+            <a:endParaRPr lang="en-US" dirty="0"/>
+          </a:p>
+        </p:txBody>
+      </p:sp>
+      <p:pic>
+        <p:nvPicPr>
+          <p:cNvPr id="1028" name="Picture 4" descr="Pan Asia Pac Geometric Network World Map Globe Polygon Graphic Background  Stock Photo - Download Image Now - iStock">
+            <a:extLst>
+              <a:ext uri="{FF2B5EF4-FFF2-40B4-BE49-F238E27FC236}">
+                <a16:creationId xmlns:a16="http://schemas.microsoft.com/office/drawing/2014/main" id="{222ACEB7-6E33-79B0-B926-FBBCB1CBC2DD}"/>
+              </a:ext>
+            </a:extLst>
+          </p:cNvPr>
+          <p:cNvPicPr>
+            <a:picLocks noChangeAspect="1" noChangeArrowheads="1"/>
+          </p:cNvPicPr>
+          <p:nvPr/>
+        </p:nvPicPr>
+        <p:blipFill>
+          <a:blip r:embed="rId5">
+            <a:extLst>
+              <a:ext uri="{28A0092B-C50C-407E-A947-70E740481C1C}">
+                <a14:useLocalDpi xmlns:a14="http://schemas.microsoft.com/office/drawing/2010/main" val="0"/>
+              </a:ext>
+            </a:extLst>
+          </a:blip>
+          <a:srcRect/>
+          <a:stretch>
+            <a:fillRect/>
+          </a:stretch>
+        </p:blipFill>
+        <p:spPr bwMode="auto">
+          <a:xfrm>
+            <a:off x="6813295" y="2179098"/>
+            <a:ext cx="4486552" cy="3071631"/>
+          </a:xfrm>
+          <a:prstGeom prst="rect">
+            <a:avLst/>
+          </a:prstGeom>
+          <a:noFill/>
+          <a:extLst>
+            <a:ext uri="{909E8E84-426E-40DD-AFC4-6F175D3DCCD1}">
+              <a14:hiddenFill xmlns:a14="http://schemas.microsoft.com/office/drawing/2010/main">
+                <a:solidFill>
+                  <a:srgbClr val="FFFFFF"/>
+                </a:solidFill>
+              </a14:hiddenFill>
+            </a:ext>
+          </a:extLst>
+        </p:spPr>
+      </p:pic>
+    </p:spTree>
+    <p:extLst>
+      <p:ext uri="{BB962C8B-B14F-4D97-AF65-F5344CB8AC3E}">
+        <p14:creationId xmlns:p14="http://schemas.microsoft.com/office/powerpoint/2010/main" val="4143983149"/>
+      </p:ext>
+    </p:extLst>
+  </p:cSld>
+  <p:clrMapOvr>
+    <a:masterClrMapping/>
+  </p:clrMapOvr>
+</p:sld>
+</file>
+
 <file path=ppt/slides/slide2.xml><?xml version="1.0" encoding="utf-8"?>
 <p:sld xmlns:a="http://schemas.openxmlformats.org/drawingml/2006/main" xmlns:r="http://schemas.openxmlformats.org/officeDocument/2006/relationships" xmlns:p="http://schemas.openxmlformats.org/presentationml/2006/main">
   <p:cSld>
@@ -21629,7 +22754,7 @@
           <a:p>
             <a:r>
               <a:rPr lang="en-US" dirty="0"/>
-              <a:t>Decision maker’s Interest</a:t>
+              <a:t>Decision maker’s interest</a:t>
             </a:r>
           </a:p>
         </p:txBody>
@@ -21653,7 +22778,7 @@
         <p:spPr>
           <a:xfrm>
             <a:off x="1024127" y="1988757"/>
-            <a:ext cx="9720073" cy="4023360"/>
+            <a:ext cx="7629679" cy="4023360"/>
           </a:xfrm>
         </p:spPr>
         <p:txBody>
@@ -21702,7 +22827,7 @@
             </a:pPr>
             <a:r>
               <a:rPr lang="en-US" sz="2000" dirty="0"/>
-              <a:t>Analyzing DPRK military &amp; political tactics</a:t>
+              <a:t>Analyzing DPRK military &amp; economy trends</a:t>
             </a:r>
           </a:p>
           <a:p>
@@ -21802,7 +22927,7 @@
                   <a:schemeClr val="tx1"/>
                 </a:solidFill>
               </a:rPr>
-              <a:t>Strategic defense decision making process</a:t>
+              <a:t>Feed into strategic decision making process</a:t>
             </a:r>
           </a:p>
         </p:txBody>
@@ -21976,8 +23101,8 @@
         </p:nvSpPr>
         <p:spPr>
           <a:xfrm>
-            <a:off x="1024129" y="1934308"/>
-            <a:ext cx="7265762" cy="4023360"/>
+            <a:off x="854445" y="2153913"/>
+            <a:ext cx="7265762" cy="2851584"/>
           </a:xfrm>
         </p:spPr>
         <p:txBody>
@@ -22052,7 +23177,7 @@
           <p:nvPr/>
         </p:nvPicPr>
         <p:blipFill>
-          <a:blip r:embed="rId3" cstate="screen">
+          <a:blip r:embed="rId3" cstate="email">
             <a:extLst>
               <a:ext uri="{28A0092B-C50C-407E-A947-70E740481C1C}">
                 <a14:useLocalDpi xmlns:a14="http://schemas.microsoft.com/office/drawing/2010/main"/>
@@ -22066,7 +23191,7 @@
         </p:blipFill>
         <p:spPr bwMode="auto">
           <a:xfrm>
-            <a:off x="7149748" y="1495382"/>
+            <a:off x="7149748" y="1523663"/>
             <a:ext cx="4018123" cy="3847139"/>
           </a:xfrm>
           <a:prstGeom prst="rect">
@@ -22101,7 +23226,7 @@
         </p:nvSpPr>
         <p:spPr>
           <a:xfrm>
-            <a:off x="7431654" y="5282799"/>
+            <a:off x="7431654" y="5311080"/>
             <a:ext cx="3454310" cy="261610"/>
           </a:xfrm>
           <a:prstGeom prst="rect">
@@ -22198,8 +23323,8 @@
         </p:nvSpPr>
         <p:spPr>
           <a:xfrm>
-            <a:off x="803861" y="2040746"/>
-            <a:ext cx="5056161" cy="4023360"/>
+            <a:off x="1066299" y="2063790"/>
+            <a:ext cx="5056161" cy="3210928"/>
           </a:xfrm>
         </p:spPr>
         <p:txBody>
@@ -22232,7 +23357,7 @@
             </a:pPr>
             <a:r>
               <a:rPr lang="en-US" sz="2400" dirty="0"/>
-              <a:t>Dates</a:t>
+              <a:t>Test dates</a:t>
             </a:r>
           </a:p>
           <a:p>
@@ -22242,7 +23367,7 @@
             </a:pPr>
             <a:r>
               <a:rPr lang="en-US" sz="2400" dirty="0"/>
-              <a:t>Distance</a:t>
+              <a:t>Travel Distance</a:t>
             </a:r>
           </a:p>
           <a:p>
@@ -22350,7 +23475,13 @@
             <p:nvPr/>
           </p:nvPicPr>
           <p:blipFill>
-            <a:blip r:embed="rId2"/>
+            <a:blip r:embed="rId2" cstate="screen">
+              <a:extLst>
+                <a:ext uri="{28A0092B-C50C-407E-A947-70E740481C1C}">
+                  <a14:useLocalDpi xmlns:a14="http://schemas.microsoft.com/office/drawing/2010/main"/>
+                </a:ext>
+              </a:extLst>
+            </a:blip>
             <a:stretch>
               <a:fillRect/>
             </a:stretch>
@@ -22784,6 +23915,52 @@
           </a:p>
         </p:txBody>
       </p:sp>
+      <p:sp>
+        <p:nvSpPr>
+          <p:cNvPr id="8" name="Arrow: Left 7">
+            <a:extLst>
+              <a:ext uri="{FF2B5EF4-FFF2-40B4-BE49-F238E27FC236}">
+                <a16:creationId xmlns:a16="http://schemas.microsoft.com/office/drawing/2014/main" id="{23EAAC9A-D847-06D1-DD5E-E1CECA025B69}"/>
+              </a:ext>
+            </a:extLst>
+          </p:cNvPr>
+          <p:cNvSpPr/>
+          <p:nvPr/>
+        </p:nvSpPr>
+        <p:spPr>
+          <a:xfrm>
+            <a:off x="4672318" y="2808342"/>
+            <a:ext cx="782349" cy="1644904"/>
+          </a:xfrm>
+          <a:prstGeom prst="leftArrow">
+            <a:avLst/>
+          </a:prstGeom>
+        </p:spPr>
+        <p:style>
+          <a:lnRef idx="2">
+            <a:schemeClr val="accent1">
+              <a:shade val="15000"/>
+            </a:schemeClr>
+          </a:lnRef>
+          <a:fillRef idx="1">
+            <a:schemeClr val="accent1"/>
+          </a:fillRef>
+          <a:effectRef idx="0">
+            <a:schemeClr val="accent1"/>
+          </a:effectRef>
+          <a:fontRef idx="minor">
+            <a:schemeClr val="lt1"/>
+          </a:fontRef>
+        </p:style>
+        <p:txBody>
+          <a:bodyPr rtlCol="0" anchor="ctr"/>
+          <a:lstStyle/>
+          <a:p>
+            <a:pPr algn="ctr"/>
+            <a:endParaRPr lang="en-US"/>
+          </a:p>
+        </p:txBody>
+      </p:sp>
     </p:spTree>
     <p:extLst>
       <p:ext uri="{BB962C8B-B14F-4D97-AF65-F5344CB8AC3E}">
@@ -22860,8 +24037,8 @@
         </p:nvSpPr>
         <p:spPr>
           <a:xfrm>
-            <a:off x="1024128" y="1892358"/>
-            <a:ext cx="6014924" cy="4023360"/>
+            <a:off x="1093417" y="2084832"/>
+            <a:ext cx="6014924" cy="3269593"/>
           </a:xfrm>
         </p:spPr>
         <p:txBody>
@@ -22875,7 +24052,7 @@
               <a:buChar char="•"/>
             </a:pPr>
             <a:r>
-              <a:rPr lang="en-US" sz="2400" dirty="0"/>
+              <a:rPr lang="en-US" sz="2000" dirty="0"/>
               <a:t>Changed ‘str’ values to ‘int’ or ‘float’</a:t>
             </a:r>
           </a:p>
@@ -22884,8 +24061,8 @@
               <a:buNone/>
             </a:pPr>
             <a:r>
-              <a:rPr lang="en-US" sz="2000" dirty="0"/>
-              <a:t>- Example: Distance data and km format</a:t>
+              <a:rPr lang="en-US" dirty="0"/>
+              <a:t>- Example: (km) values in the distance column</a:t>
             </a:r>
           </a:p>
           <a:p>
@@ -22894,15 +24071,15 @@
               <a:buChar char="•"/>
             </a:pPr>
             <a:r>
-              <a:rPr lang="en-US" sz="2400" dirty="0"/>
+              <a:rPr lang="en-US" sz="2000" dirty="0"/>
               <a:t>Replaced ‘Unknown’ values to ‘</a:t>
             </a:r>
             <a:r>
-              <a:rPr lang="en-US" sz="2400" dirty="0" err="1"/>
+              <a:rPr lang="en-US" sz="2000" dirty="0" err="1"/>
               <a:t>NaN</a:t>
             </a:r>
             <a:r>
-              <a:rPr lang="en-US" sz="2400" dirty="0"/>
+              <a:rPr lang="en-US" sz="2000" dirty="0"/>
               <a:t>’</a:t>
             </a:r>
           </a:p>
@@ -22912,8 +24089,8 @@
               <a:buChar char="•"/>
             </a:pPr>
             <a:r>
-              <a:rPr lang="en-US" sz="2400" dirty="0"/>
-              <a:t>Created new columns for applying functions</a:t>
+              <a:rPr lang="en-US" sz="2000" dirty="0"/>
+              <a:t>Created new columns with given data</a:t>
             </a:r>
           </a:p>
           <a:p>
@@ -22921,16 +24098,8 @@
               <a:buNone/>
             </a:pPr>
             <a:r>
-              <a:rPr lang="en-US" sz="2000" dirty="0"/>
-              <a:t>- Example: ‘Year’, ‘</a:t>
-            </a:r>
-            <a:r>
-              <a:rPr lang="en-US" sz="2000" dirty="0" err="1"/>
-              <a:t>Month_Number</a:t>
-            </a:r>
-            <a:r>
-              <a:rPr lang="en-US" sz="2000" dirty="0"/>
-              <a:t>’, ‘YYYYMM’</a:t>
+              <a:rPr lang="en-US" dirty="0"/>
+              <a:t>- Example: ‘Year’, ‘YYYYMM’ from dates column</a:t>
             </a:r>
           </a:p>
           <a:p>
@@ -22938,10 +24107,7 @@
               <a:buFont typeface="Arial" panose="020B0604020202020204" pitchFamily="34" charset="0"/>
               <a:buChar char="•"/>
             </a:pPr>
-            <a:r>
-              <a:rPr lang="en-US" sz="2400" dirty="0"/>
-              <a:t>New column that gives values for each row</a:t>
-            </a:r>
+            <a:endParaRPr lang="en-US" sz="2000" b="1" i="1" u="sng" dirty="0"/>
           </a:p>
           <a:p>
             <a:pPr marL="285750" indent="-285750">
@@ -22949,8 +24115,8 @@
               <a:buChar char="•"/>
             </a:pPr>
             <a:r>
-              <a:rPr lang="en-US" sz="2400" b="1" dirty="0"/>
-              <a:t>Consideration</a:t>
+              <a:rPr lang="en-US" sz="2000" b="1" i="1" u="sng" dirty="0"/>
+              <a:t>Considered but actions not taken</a:t>
             </a:r>
           </a:p>
           <a:p>
@@ -22958,8 +24124,8 @@
               <a:buNone/>
             </a:pPr>
             <a:r>
-              <a:rPr lang="en-US" sz="2000" dirty="0"/>
-              <a:t>- duplicated data </a:t>
+              <a:rPr lang="en-US" dirty="0"/>
+              <a:t>- duplicating data </a:t>
             </a:r>
           </a:p>
           <a:p>
@@ -22985,14 +24151,14 @@
           <p:nvPr/>
         </p:nvPicPr>
         <p:blipFill>
-          <a:blip r:embed="rId2"/>
+          <a:blip r:embed="rId3"/>
           <a:stretch>
             <a:fillRect/>
           </a:stretch>
         </p:blipFill>
         <p:spPr>
           <a:xfrm>
-            <a:off x="7509944" y="1713538"/>
+            <a:off x="7509944" y="1776953"/>
             <a:ext cx="3324689" cy="3953427"/>
           </a:xfrm>
           <a:prstGeom prst="rect">
@@ -23014,8 +24180,8 @@
         </p:nvSpPr>
         <p:spPr>
           <a:xfrm>
-            <a:off x="7657050" y="5586578"/>
-            <a:ext cx="3030476" cy="369332"/>
+            <a:off x="8002119" y="5653958"/>
+            <a:ext cx="3030476" cy="307777"/>
           </a:xfrm>
           <a:prstGeom prst="rect">
             <a:avLst/>
@@ -23029,16 +24195,51 @@
           <a:lstStyle/>
           <a:p>
             <a:r>
-              <a:rPr lang="en-US" dirty="0"/>
+              <a:rPr lang="en-US" sz="1400" dirty="0"/>
               <a:t>(Screen captured from </a:t>
             </a:r>
             <a:r>
-              <a:rPr lang="en-US" dirty="0" err="1"/>
-              <a:t>Vscode</a:t>
+              <a:rPr lang="en-US" sz="1400" dirty="0" err="1"/>
+              <a:t>VScode</a:t>
             </a:r>
             <a:r>
-              <a:rPr lang="en-US" dirty="0"/>
+              <a:rPr lang="en-US" sz="1400" dirty="0"/>
               <a:t>)</a:t>
+            </a:r>
+          </a:p>
+        </p:txBody>
+      </p:sp>
+      <p:sp>
+        <p:nvSpPr>
+          <p:cNvPr id="3" name="TextBox 2">
+            <a:extLst>
+              <a:ext uri="{FF2B5EF4-FFF2-40B4-BE49-F238E27FC236}">
+                <a16:creationId xmlns:a16="http://schemas.microsoft.com/office/drawing/2014/main" id="{F31B2DBF-FA84-5198-0447-9FADC44FEB11}"/>
+              </a:ext>
+            </a:extLst>
+          </p:cNvPr>
+          <p:cNvSpPr txBox="1"/>
+          <p:nvPr/>
+        </p:nvSpPr>
+        <p:spPr>
+          <a:xfrm>
+            <a:off x="8408884" y="1479239"/>
+            <a:ext cx="1526808" cy="400110"/>
+          </a:xfrm>
+          <a:prstGeom prst="rect">
+            <a:avLst/>
+          </a:prstGeom>
+          <a:noFill/>
+        </p:spPr>
+        <p:txBody>
+          <a:bodyPr wrap="square">
+            <a:spAutoFit/>
+          </a:bodyPr>
+          <a:lstStyle/>
+          <a:p>
+            <a:r>
+              <a:rPr lang="en-US" sz="2000" dirty="0"/>
+              <a:t>New columns</a:t>
             </a:r>
           </a:p>
         </p:txBody>
@@ -23175,7 +24376,13 @@
           </p:nvPr>
         </p:nvPicPr>
         <p:blipFill>
-          <a:blip r:embed="rId2"/>
+          <a:blip r:embed="rId2" cstate="email">
+            <a:extLst>
+              <a:ext uri="{28A0092B-C50C-407E-A947-70E740481C1C}">
+                <a14:useLocalDpi xmlns:a14="http://schemas.microsoft.com/office/drawing/2010/main"/>
+              </a:ext>
+            </a:extLst>
+          </a:blip>
           <a:stretch>
             <a:fillRect/>
           </a:stretch>
@@ -23219,38 +24426,43 @@
       </p:grpSpPr>
       <p:pic>
         <p:nvPicPr>
-          <p:cNvPr id="7" name="Picture 6">
+          <p:cNvPr id="13" name="Content Placeholder 12">
             <a:extLst>
               <a:ext uri="{FF2B5EF4-FFF2-40B4-BE49-F238E27FC236}">
-                <a16:creationId xmlns:a16="http://schemas.microsoft.com/office/drawing/2014/main" id="{37A11094-F96C-C4D4-E5AF-F0FFF2A98DD9}"/>
+                <a16:creationId xmlns:a16="http://schemas.microsoft.com/office/drawing/2014/main" id="{1FBC1C16-8898-0232-6219-3342EBDDFC10}"/>
               </a:ext>
             </a:extLst>
           </p:cNvPr>
           <p:cNvPicPr>
-            <a:picLocks noChangeAspect="1"/>
+            <a:picLocks noGrp="1" noChangeAspect="1"/>
           </p:cNvPicPr>
-          <p:nvPr/>
+          <p:nvPr>
+            <p:ph idx="1"/>
+          </p:nvPr>
         </p:nvPicPr>
         <p:blipFill>
-          <a:blip r:embed="rId3"/>
+          <a:blip r:embed="rId2" cstate="email">
+            <a:extLst>
+              <a:ext uri="{28A0092B-C50C-407E-A947-70E740481C1C}">
+                <a14:useLocalDpi xmlns:a14="http://schemas.microsoft.com/office/drawing/2010/main"/>
+              </a:ext>
+            </a:extLst>
+          </a:blip>
           <a:stretch>
             <a:fillRect/>
           </a:stretch>
         </p:blipFill>
         <p:spPr>
           <a:xfrm>
-            <a:off x="40362" y="0"/>
-            <a:ext cx="12111276" cy="6858000"/>
+            <a:off x="392345" y="111489"/>
+            <a:ext cx="11407310" cy="6635021"/>
           </a:xfrm>
-          <a:prstGeom prst="rect">
-            <a:avLst/>
-          </a:prstGeom>
         </p:spPr>
       </p:pic>
     </p:spTree>
     <p:extLst>
       <p:ext uri="{BB962C8B-B14F-4D97-AF65-F5344CB8AC3E}">
-        <p14:creationId xmlns:p14="http://schemas.microsoft.com/office/powerpoint/2010/main" val="4063832219"/>
+        <p14:creationId xmlns:p14="http://schemas.microsoft.com/office/powerpoint/2010/main" val="1468967045"/>
       </p:ext>
     </p:extLst>
   </p:cSld>
@@ -23277,60 +24489,40 @@
           <a:chExt cx="0" cy="0"/>
         </a:xfrm>
       </p:grpSpPr>
-      <p:sp>
-        <p:nvSpPr>
-          <p:cNvPr id="2" name="Title 1">
+      <p:pic>
+        <p:nvPicPr>
+          <p:cNvPr id="9" name="Picture 8">
             <a:extLst>
               <a:ext uri="{FF2B5EF4-FFF2-40B4-BE49-F238E27FC236}">
-                <a16:creationId xmlns:a16="http://schemas.microsoft.com/office/drawing/2014/main" id="{A135EF62-63FE-567B-72D1-5AC597D76F42}"/>
+                <a16:creationId xmlns:a16="http://schemas.microsoft.com/office/drawing/2014/main" id="{B3172F00-7FA8-EF13-75F1-CD88E33A4156}"/>
               </a:ext>
             </a:extLst>
           </p:cNvPr>
-          <p:cNvSpPr>
-            <a:spLocks noGrp="1"/>
-          </p:cNvSpPr>
-          <p:nvPr>
-            <p:ph type="title"/>
-          </p:nvPr>
-        </p:nvSpPr>
-        <p:spPr/>
-        <p:txBody>
-          <a:bodyPr/>
-          <a:lstStyle/>
-          <a:p>
-            <a:endParaRPr lang="en-US"/>
-          </a:p>
-        </p:txBody>
-      </p:sp>
-      <p:sp>
-        <p:nvSpPr>
-          <p:cNvPr id="3" name="Content Placeholder 2">
-            <a:extLst>
-              <a:ext uri="{FF2B5EF4-FFF2-40B4-BE49-F238E27FC236}">
-                <a16:creationId xmlns:a16="http://schemas.microsoft.com/office/drawing/2014/main" id="{DFBAFDFA-2C63-9743-B001-7CDE7494BF7A}"/>
-              </a:ext>
-            </a:extLst>
-          </p:cNvPr>
-          <p:cNvSpPr>
-            <a:spLocks noGrp="1"/>
-          </p:cNvSpPr>
-          <p:nvPr>
-            <p:ph idx="1"/>
-          </p:nvPr>
-        </p:nvSpPr>
-        <p:spPr/>
-        <p:txBody>
-          <a:bodyPr/>
-          <a:lstStyle/>
-          <a:p>
-            <a:endParaRPr lang="en-US"/>
-          </a:p>
-        </p:txBody>
-      </p:sp>
+          <p:cNvPicPr>
+            <a:picLocks noChangeAspect="1"/>
+          </p:cNvPicPr>
+          <p:nvPr/>
+        </p:nvPicPr>
+        <p:blipFill>
+          <a:blip r:embed="rId2"/>
+          <a:stretch>
+            <a:fillRect/>
+          </a:stretch>
+        </p:blipFill>
+        <p:spPr>
+          <a:xfrm>
+            <a:off x="381000" y="571500"/>
+            <a:ext cx="11430000" cy="5715000"/>
+          </a:xfrm>
+          <a:prstGeom prst="rect">
+            <a:avLst/>
+          </a:prstGeom>
+        </p:spPr>
+      </p:pic>
     </p:spTree>
     <p:extLst>
       <p:ext uri="{BB962C8B-B14F-4D97-AF65-F5344CB8AC3E}">
-        <p14:creationId xmlns:p14="http://schemas.microsoft.com/office/powerpoint/2010/main" val="1468967045"/>
+        <p14:creationId xmlns:p14="http://schemas.microsoft.com/office/powerpoint/2010/main" val="1839660808"/>
       </p:ext>
     </p:extLst>
   </p:cSld>
@@ -23904,6 +25096,15 @@
 </file>
 
 <file path=customXml/item1.xml><?xml version="1.0" encoding="utf-8"?>
+<?mso-contentType ?>
+<FormTemplates xmlns="http://schemas.microsoft.com/sharepoint/v3/contenttype/forms">
+  <Display>DocumentLibraryForm</Display>
+  <Edit>DocumentLibraryForm</Edit>
+  <New>DocumentLibraryForm</New>
+</FormTemplates>
+</file>
+
+<file path=customXml/item2.xml><?xml version="1.0" encoding="utf-8"?>
 <ct:contentTypeSchema xmlns:ct="http://schemas.microsoft.com/office/2006/metadata/contentType" xmlns:ma="http://schemas.microsoft.com/office/2006/metadata/properties/metaAttributes" ct:_="" ma:_="" ma:contentTypeName="Document" ma:contentTypeID="0x01010079F111ED35F8CC479449609E8A0923A6" ma:contentTypeVersion="11" ma:contentTypeDescription="Create a new document." ma:contentTypeScope="" ma:versionID="9677210f24a1be23c92c90fd886aa0aa">
   <xsd:schema xmlns:xsd="http://www.w3.org/2001/XMLSchema" xmlns:xs="http://www.w3.org/2001/XMLSchema" xmlns:p="http://schemas.microsoft.com/office/2006/metadata/properties" xmlns:ns2="71af3243-3dd4-4a8d-8c0d-dd76da1f02a5" xmlns:ns3="16c05727-aa75-4e4a-9b5f-8a80a1165891" targetNamespace="http://schemas.microsoft.com/office/2006/metadata/properties" ma:root="true" ma:fieldsID="60e05723c5c1908df1a1a4ebf11d344e" ns2:_="" ns3:_="">
     <xsd:import namespace="71af3243-3dd4-4a8d-8c0d-dd76da1f02a5"/>
@@ -24114,15 +25315,6 @@
 </ct:contentTypeSchema>
 </file>
 
-<file path=customXml/item2.xml><?xml version="1.0" encoding="utf-8"?>
-<?mso-contentType ?>
-<FormTemplates xmlns="http://schemas.microsoft.com/sharepoint/v3/contenttype/forms">
-  <Display>DocumentLibraryForm</Display>
-  <Edit>DocumentLibraryForm</Edit>
-  <New>DocumentLibraryForm</New>
-</FormTemplates>
-</file>
-
 <file path=customXml/item3.xml><?xml version="1.0" encoding="utf-8"?>
 <p:properties xmlns:p="http://schemas.microsoft.com/office/2006/metadata/properties" xmlns:xsi="http://www.w3.org/2001/XMLSchema-instance" xmlns:pc="http://schemas.microsoft.com/office/infopath/2007/PartnerControls">
   <documentManagement>
@@ -24132,6 +25324,14 @@
 </file>
 
 <file path=customXml/itemProps1.xml><?xml version="1.0" encoding="utf-8"?>
+<ds:datastoreItem xmlns:ds="http://schemas.openxmlformats.org/officeDocument/2006/customXml" ds:itemID="{4F44C90D-2A62-4985-9618-3460247437B1}">
+  <ds:schemaRefs>
+    <ds:schemaRef ds:uri="http://schemas.microsoft.com/sharepoint/v3/contenttype/forms"/>
+  </ds:schemaRefs>
+</ds:datastoreItem>
+</file>
+
+<file path=customXml/itemProps2.xml><?xml version="1.0" encoding="utf-8"?>
 <ds:datastoreItem xmlns:ds="http://schemas.openxmlformats.org/officeDocument/2006/customXml" ds:itemID="{B61EAB5F-88FC-4FAE-AE3C-037A3C365EB8}">
   <ds:schemaRefs>
     <ds:schemaRef ds:uri="http://schemas.microsoft.com/office/2006/metadata/contentType"/>
@@ -24150,14 +25350,6 @@
 </ds:datastoreItem>
 </file>
 
-<file path=customXml/itemProps2.xml><?xml version="1.0" encoding="utf-8"?>
-<ds:datastoreItem xmlns:ds="http://schemas.openxmlformats.org/officeDocument/2006/customXml" ds:itemID="{4F44C90D-2A62-4985-9618-3460247437B1}">
-  <ds:schemaRefs>
-    <ds:schemaRef ds:uri="http://schemas.microsoft.com/sharepoint/v3/contenttype/forms"/>
-  </ds:schemaRefs>
-</ds:datastoreItem>
-</file>
-
 <file path=customXml/itemProps3.xml><?xml version="1.0" encoding="utf-8"?>
 <ds:datastoreItem xmlns:ds="http://schemas.openxmlformats.org/officeDocument/2006/customXml" ds:itemID="{788A2F88-55C5-4ED1-9541-807C65424763}">
   <ds:schemaRefs>

</xml_diff>